<commit_message>
add figures to readme
</commit_message>
<xml_diff>
--- a/experiments/experiment_008/experiment_008.pptx
+++ b/experiments/experiment_008/experiment_008.pptx
@@ -3416,7 +3416,7 @@
         </p:nvSpPr>
         <p:spPr>
           <a:xfrm>
-            <a:off x="2101197" y="4754776"/>
+            <a:off x="2101197" y="4682587"/>
             <a:ext cx="981038" cy="169277"/>
           </a:xfrm>
           <a:prstGeom prst="rect">
@@ -3469,7 +3469,7 @@
           <a:solidFill>
             <a:srgbClr val="993366"/>
           </a:solidFill>
-          <a:ln w="9525">
+          <a:ln w="6350">
             <a:solidFill>
               <a:schemeClr val="tx1"/>
             </a:solidFill>
@@ -3514,7 +3514,7 @@
         </p:nvSpPr>
         <p:spPr>
           <a:xfrm>
-            <a:off x="3146229" y="4747083"/>
+            <a:off x="3146229" y="4674894"/>
             <a:ext cx="372818" cy="184666"/>
           </a:xfrm>
           <a:prstGeom prst="rightArrow">
@@ -3526,7 +3526,7 @@
           <a:solidFill>
             <a:srgbClr val="00FF00"/>
           </a:solidFill>
-          <a:ln w="9525">
+          <a:ln w="6350">
             <a:solidFill>
               <a:schemeClr val="tx1"/>
             </a:solidFill>

</xml_diff>